<commit_message>
Update Github CIL -1
</commit_message>
<xml_diff>
--- a/Article/Github/Github_CIL_1/img/img.pptx
+++ b/Article/Github/Github_CIL_1/img/img.pptx
@@ -6,6 +6,7 @@
   </p:sldMasterIdLst>
   <p:sldIdLst>
     <p:sldId id="256" r:id="rId2"/>
+    <p:sldId id="257" r:id="rId3"/>
   </p:sldIdLst>
   <p:sldSz cx="12192000" cy="6858000"/>
   <p:notesSz cx="6858000" cy="9144000"/>
@@ -270,7 +271,7 @@
           <a:p>
             <a:fld id="{9B2059C7-4EC9-4BC8-BB89-A1608C746702}" type="datetimeFigureOut">
               <a:rPr lang="ko-KR" altLang="en-US" smtClean="0"/>
-              <a:t>2020-09-18</a:t>
+              <a:t>2020-09-19</a:t>
             </a:fld>
             <a:endParaRPr lang="ko-KR" altLang="en-US"/>
           </a:p>
@@ -468,7 +469,7 @@
           <a:p>
             <a:fld id="{9B2059C7-4EC9-4BC8-BB89-A1608C746702}" type="datetimeFigureOut">
               <a:rPr lang="ko-KR" altLang="en-US" smtClean="0"/>
-              <a:t>2020-09-18</a:t>
+              <a:t>2020-09-19</a:t>
             </a:fld>
             <a:endParaRPr lang="ko-KR" altLang="en-US"/>
           </a:p>
@@ -676,7 +677,7 @@
           <a:p>
             <a:fld id="{9B2059C7-4EC9-4BC8-BB89-A1608C746702}" type="datetimeFigureOut">
               <a:rPr lang="ko-KR" altLang="en-US" smtClean="0"/>
-              <a:t>2020-09-18</a:t>
+              <a:t>2020-09-19</a:t>
             </a:fld>
             <a:endParaRPr lang="ko-KR" altLang="en-US"/>
           </a:p>
@@ -874,7 +875,7 @@
           <a:p>
             <a:fld id="{9B2059C7-4EC9-4BC8-BB89-A1608C746702}" type="datetimeFigureOut">
               <a:rPr lang="ko-KR" altLang="en-US" smtClean="0"/>
-              <a:t>2020-09-18</a:t>
+              <a:t>2020-09-19</a:t>
             </a:fld>
             <a:endParaRPr lang="ko-KR" altLang="en-US"/>
           </a:p>
@@ -1149,7 +1150,7 @@
           <a:p>
             <a:fld id="{9B2059C7-4EC9-4BC8-BB89-A1608C746702}" type="datetimeFigureOut">
               <a:rPr lang="ko-KR" altLang="en-US" smtClean="0"/>
-              <a:t>2020-09-18</a:t>
+              <a:t>2020-09-19</a:t>
             </a:fld>
             <a:endParaRPr lang="ko-KR" altLang="en-US"/>
           </a:p>
@@ -1414,7 +1415,7 @@
           <a:p>
             <a:fld id="{9B2059C7-4EC9-4BC8-BB89-A1608C746702}" type="datetimeFigureOut">
               <a:rPr lang="ko-KR" altLang="en-US" smtClean="0"/>
-              <a:t>2020-09-18</a:t>
+              <a:t>2020-09-19</a:t>
             </a:fld>
             <a:endParaRPr lang="ko-KR" altLang="en-US"/>
           </a:p>
@@ -1826,7 +1827,7 @@
           <a:p>
             <a:fld id="{9B2059C7-4EC9-4BC8-BB89-A1608C746702}" type="datetimeFigureOut">
               <a:rPr lang="ko-KR" altLang="en-US" smtClean="0"/>
-              <a:t>2020-09-18</a:t>
+              <a:t>2020-09-19</a:t>
             </a:fld>
             <a:endParaRPr lang="ko-KR" altLang="en-US"/>
           </a:p>
@@ -1967,7 +1968,7 @@
           <a:p>
             <a:fld id="{9B2059C7-4EC9-4BC8-BB89-A1608C746702}" type="datetimeFigureOut">
               <a:rPr lang="ko-KR" altLang="en-US" smtClean="0"/>
-              <a:t>2020-09-18</a:t>
+              <a:t>2020-09-19</a:t>
             </a:fld>
             <a:endParaRPr lang="ko-KR" altLang="en-US"/>
           </a:p>
@@ -2080,7 +2081,7 @@
           <a:p>
             <a:fld id="{9B2059C7-4EC9-4BC8-BB89-A1608C746702}" type="datetimeFigureOut">
               <a:rPr lang="ko-KR" altLang="en-US" smtClean="0"/>
-              <a:t>2020-09-18</a:t>
+              <a:t>2020-09-19</a:t>
             </a:fld>
             <a:endParaRPr lang="ko-KR" altLang="en-US"/>
           </a:p>
@@ -2391,7 +2392,7 @@
           <a:p>
             <a:fld id="{9B2059C7-4EC9-4BC8-BB89-A1608C746702}" type="datetimeFigureOut">
               <a:rPr lang="ko-KR" altLang="en-US" smtClean="0"/>
-              <a:t>2020-09-18</a:t>
+              <a:t>2020-09-19</a:t>
             </a:fld>
             <a:endParaRPr lang="ko-KR" altLang="en-US"/>
           </a:p>
@@ -2679,7 +2680,7 @@
           <a:p>
             <a:fld id="{9B2059C7-4EC9-4BC8-BB89-A1608C746702}" type="datetimeFigureOut">
               <a:rPr lang="ko-KR" altLang="en-US" smtClean="0"/>
-              <a:t>2020-09-18</a:t>
+              <a:t>2020-09-19</a:t>
             </a:fld>
             <a:endParaRPr lang="ko-KR" altLang="en-US"/>
           </a:p>
@@ -2920,7 +2921,7 @@
           <a:p>
             <a:fld id="{9B2059C7-4EC9-4BC8-BB89-A1608C746702}" type="datetimeFigureOut">
               <a:rPr lang="ko-KR" altLang="en-US" smtClean="0"/>
-              <a:t>2020-09-18</a:t>
+              <a:t>2020-09-19</a:t>
             </a:fld>
             <a:endParaRPr lang="ko-KR" altLang="en-US"/>
           </a:p>
@@ -3794,6 +3795,228 @@
 </p:sld>
 </file>
 
+<file path=ppt/slides/slide2.xml><?xml version="1.0" encoding="utf-8"?>
+<p:sld xmlns:a="http://schemas.openxmlformats.org/drawingml/2006/main" xmlns:r="http://schemas.openxmlformats.org/officeDocument/2006/relationships" xmlns:p="http://schemas.openxmlformats.org/presentationml/2006/main">
+  <p:cSld>
+    <p:spTree>
+      <p:nvGrpSpPr>
+        <p:cNvPr id="1" name=""/>
+        <p:cNvGrpSpPr/>
+        <p:nvPr/>
+      </p:nvGrpSpPr>
+      <p:grpSpPr>
+        <a:xfrm>
+          <a:off x="0" y="0"/>
+          <a:ext cx="0" cy="0"/>
+          <a:chOff x="0" y="0"/>
+          <a:chExt cx="0" cy="0"/>
+        </a:xfrm>
+      </p:grpSpPr>
+      <p:pic>
+        <p:nvPicPr>
+          <p:cNvPr id="5" name="그림 4" descr="스크린샷이(가) 표시된 사진&#10;&#10;자동 생성된 설명">
+            <a:extLst>
+              <a:ext uri="{FF2B5EF4-FFF2-40B4-BE49-F238E27FC236}">
+                <a16:creationId xmlns:a16="http://schemas.microsoft.com/office/drawing/2014/main" id="{1B413C8E-C0EC-4C3D-BF5D-EB67566A2DC4}"/>
+              </a:ext>
+            </a:extLst>
+          </p:cNvPr>
+          <p:cNvPicPr>
+            <a:picLocks noChangeAspect="1"/>
+          </p:cNvPicPr>
+          <p:nvPr/>
+        </p:nvPicPr>
+        <p:blipFill>
+          <a:blip r:embed="rId2">
+            <a:extLst>
+              <a:ext uri="{28A0092B-C50C-407E-A947-70E740481C1C}">
+                <a14:useLocalDpi xmlns:a14="http://schemas.microsoft.com/office/drawing/2010/main" val="0"/>
+              </a:ext>
+            </a:extLst>
+          </a:blip>
+          <a:stretch>
+            <a:fillRect/>
+          </a:stretch>
+        </p:blipFill>
+        <p:spPr>
+          <a:xfrm>
+            <a:off x="3448471" y="0"/>
+            <a:ext cx="5295058" cy="6858000"/>
+          </a:xfrm>
+          <a:prstGeom prst="rect">
+            <a:avLst/>
+          </a:prstGeom>
+        </p:spPr>
+      </p:pic>
+      <p:sp>
+        <p:nvSpPr>
+          <p:cNvPr id="6" name="직사각형 5">
+            <a:extLst>
+              <a:ext uri="{FF2B5EF4-FFF2-40B4-BE49-F238E27FC236}">
+                <a16:creationId xmlns:a16="http://schemas.microsoft.com/office/drawing/2014/main" id="{93DD77B0-4040-479F-B5E7-B1AC6DA0D43C}"/>
+              </a:ext>
+            </a:extLst>
+          </p:cNvPr>
+          <p:cNvSpPr/>
+          <p:nvPr/>
+        </p:nvSpPr>
+        <p:spPr>
+          <a:xfrm>
+            <a:off x="4124130" y="2953139"/>
+            <a:ext cx="382555" cy="475861"/>
+          </a:xfrm>
+          <a:prstGeom prst="rect">
+            <a:avLst/>
+          </a:prstGeom>
+          <a:solidFill>
+            <a:schemeClr val="bg1"/>
+          </a:solidFill>
+          <a:ln>
+            <a:noFill/>
+          </a:ln>
+        </p:spPr>
+        <p:style>
+          <a:lnRef idx="2">
+            <a:schemeClr val="accent1">
+              <a:shade val="50000"/>
+            </a:schemeClr>
+          </a:lnRef>
+          <a:fillRef idx="1">
+            <a:schemeClr val="accent1"/>
+          </a:fillRef>
+          <a:effectRef idx="0">
+            <a:schemeClr val="accent1"/>
+          </a:effectRef>
+          <a:fontRef idx="minor">
+            <a:schemeClr val="lt1"/>
+          </a:fontRef>
+        </p:style>
+        <p:txBody>
+          <a:bodyPr rtlCol="0" anchor="ctr"/>
+          <a:lstStyle/>
+          <a:p>
+            <a:pPr algn="ctr"/>
+            <a:endParaRPr lang="ko-KR" altLang="en-US"/>
+          </a:p>
+        </p:txBody>
+      </p:sp>
+      <p:sp>
+        <p:nvSpPr>
+          <p:cNvPr id="7" name="직사각형 6">
+            <a:extLst>
+              <a:ext uri="{FF2B5EF4-FFF2-40B4-BE49-F238E27FC236}">
+                <a16:creationId xmlns:a16="http://schemas.microsoft.com/office/drawing/2014/main" id="{420D01C0-7D73-447D-A4D7-2DC81A2B5F76}"/>
+              </a:ext>
+            </a:extLst>
+          </p:cNvPr>
+          <p:cNvSpPr/>
+          <p:nvPr/>
+        </p:nvSpPr>
+        <p:spPr>
+          <a:xfrm>
+            <a:off x="5094514" y="6144209"/>
+            <a:ext cx="1362270" cy="200608"/>
+          </a:xfrm>
+          <a:prstGeom prst="rect">
+            <a:avLst/>
+          </a:prstGeom>
+          <a:solidFill>
+            <a:schemeClr val="bg1"/>
+          </a:solidFill>
+          <a:ln>
+            <a:noFill/>
+          </a:ln>
+        </p:spPr>
+        <p:style>
+          <a:lnRef idx="2">
+            <a:schemeClr val="accent1">
+              <a:shade val="50000"/>
+            </a:schemeClr>
+          </a:lnRef>
+          <a:fillRef idx="1">
+            <a:schemeClr val="accent1"/>
+          </a:fillRef>
+          <a:effectRef idx="0">
+            <a:schemeClr val="accent1"/>
+          </a:effectRef>
+          <a:fontRef idx="minor">
+            <a:schemeClr val="lt1"/>
+          </a:fontRef>
+        </p:style>
+        <p:txBody>
+          <a:bodyPr rtlCol="0" anchor="ctr"/>
+          <a:lstStyle/>
+          <a:p>
+            <a:pPr algn="ctr"/>
+            <a:endParaRPr lang="ko-KR" altLang="en-US"/>
+          </a:p>
+        </p:txBody>
+      </p:sp>
+      <p:sp>
+        <p:nvSpPr>
+          <p:cNvPr id="8" name="직사각형 7">
+            <a:extLst>
+              <a:ext uri="{FF2B5EF4-FFF2-40B4-BE49-F238E27FC236}">
+                <a16:creationId xmlns:a16="http://schemas.microsoft.com/office/drawing/2014/main" id="{BC1AD64B-710A-4C7B-BFF5-E9E512BAD977}"/>
+              </a:ext>
+            </a:extLst>
+          </p:cNvPr>
+          <p:cNvSpPr/>
+          <p:nvPr/>
+        </p:nvSpPr>
+        <p:spPr>
+          <a:xfrm>
+            <a:off x="7843496" y="6144209"/>
+            <a:ext cx="591377" cy="200608"/>
+          </a:xfrm>
+          <a:prstGeom prst="rect">
+            <a:avLst/>
+          </a:prstGeom>
+          <a:solidFill>
+            <a:schemeClr val="bg1"/>
+          </a:solidFill>
+          <a:ln>
+            <a:noFill/>
+          </a:ln>
+        </p:spPr>
+        <p:style>
+          <a:lnRef idx="2">
+            <a:schemeClr val="accent1">
+              <a:shade val="50000"/>
+            </a:schemeClr>
+          </a:lnRef>
+          <a:fillRef idx="1">
+            <a:schemeClr val="accent1"/>
+          </a:fillRef>
+          <a:effectRef idx="0">
+            <a:schemeClr val="accent1"/>
+          </a:effectRef>
+          <a:fontRef idx="minor">
+            <a:schemeClr val="lt1"/>
+          </a:fontRef>
+        </p:style>
+        <p:txBody>
+          <a:bodyPr rtlCol="0" anchor="ctr"/>
+          <a:lstStyle/>
+          <a:p>
+            <a:pPr algn="ctr"/>
+            <a:endParaRPr lang="ko-KR" altLang="en-US"/>
+          </a:p>
+        </p:txBody>
+      </p:sp>
+    </p:spTree>
+    <p:extLst>
+      <p:ext uri="{BB962C8B-B14F-4D97-AF65-F5344CB8AC3E}">
+        <p14:creationId xmlns:p14="http://schemas.microsoft.com/office/powerpoint/2010/main" val="1224630749"/>
+      </p:ext>
+    </p:extLst>
+  </p:cSld>
+  <p:clrMapOvr>
+    <a:masterClrMapping/>
+  </p:clrMapOvr>
+</p:sld>
+</file>
+
 <file path=ppt/theme/theme1.xml><?xml version="1.0" encoding="utf-8"?>
 <a:theme xmlns:a="http://schemas.openxmlformats.org/drawingml/2006/main" name="Office 테마">
   <a:themeElements>

</xml_diff>